<commit_message>
changed some word and font size @praesentatio
</commit_message>
<xml_diff>
--- a/praesentationens/projektvorstellung/projektvorstellung.pptx
+++ b/praesentationens/projektvorstellung/projektvorstellung.pptx
@@ -113,6 +113,11 @@
       </a:defRPr>
     </a:lvl9pPr>
   </p:defaultTextStyle>
+  <p:extLst>
+    <p:ext uri="{EFAFB233-063F-42B5-8137-9DF3F51BA10A}">
+      <p15:sldGuideLst xmlns:p15="http://schemas.microsoft.com/office/powerpoint/2012/main"/>
+    </p:ext>
+  </p:extLst>
 </p:presentation>
 </file>
 
@@ -198,7 +203,7 @@
           <a:p>
             <a:fld id="{10CA745B-DE21-4EC9-8324-EEE5FEA25266}" type="datetimeFigureOut">
               <a:rPr lang="de-DE" smtClean="0"/>
-              <a:t>23.02.2016</a:t>
+              <a:t>24.02.2016</a:t>
             </a:fld>
             <a:endParaRPr lang="de-DE"/>
           </a:p>
@@ -5993,8 +5998,8 @@
         </p:nvSpPr>
         <p:spPr>
           <a:xfrm>
-            <a:off x="1484311" y="685800"/>
-            <a:ext cx="10018713" cy="1752599"/>
+            <a:off x="1484311" y="685801"/>
+            <a:ext cx="10018713" cy="1447800"/>
           </a:xfrm>
           <a:prstGeom prst="rect">
             <a:avLst/>
@@ -6008,7 +6013,7 @@
           <a:lstStyle/>
           <a:p>
             <a:r>
-              <a:rPr lang="de-DE" smtClean="0"/>
+              <a:rPr lang="de-DE" dirty="0" smtClean="0"/>
               <a:t>Titelmasterformat durch Klicken bearbeiten</a:t>
             </a:r>
             <a:endParaRPr lang="en-US" dirty="0"/>
@@ -6027,8 +6032,8 @@
         </p:nvSpPr>
         <p:spPr>
           <a:xfrm>
-            <a:off x="1484310" y="2666999"/>
-            <a:ext cx="10018713" cy="3124201"/>
+            <a:off x="1484310" y="2181226"/>
+            <a:ext cx="10018713" cy="3609975"/>
           </a:xfrm>
           <a:prstGeom prst="rect">
             <a:avLst/>
@@ -6042,35 +6047,35 @@
           <a:p>
             <a:pPr lvl="0"/>
             <a:r>
-              <a:rPr lang="de-DE" smtClean="0"/>
+              <a:rPr lang="de-DE" dirty="0" smtClean="0"/>
               <a:t>Textmasterformat bearbeiten</a:t>
             </a:r>
           </a:p>
           <a:p>
             <a:pPr lvl="1"/>
             <a:r>
-              <a:rPr lang="de-DE" smtClean="0"/>
+              <a:rPr lang="de-DE" dirty="0" smtClean="0"/>
               <a:t>Zweite Ebene</a:t>
             </a:r>
           </a:p>
           <a:p>
             <a:pPr lvl="2"/>
             <a:r>
-              <a:rPr lang="de-DE" smtClean="0"/>
+              <a:rPr lang="de-DE" dirty="0" smtClean="0"/>
               <a:t>Dritte Ebene</a:t>
             </a:r>
           </a:p>
           <a:p>
             <a:pPr lvl="3"/>
             <a:r>
-              <a:rPr lang="de-DE" smtClean="0"/>
+              <a:rPr lang="de-DE" dirty="0" smtClean="0"/>
               <a:t>Vierte Ebene</a:t>
             </a:r>
           </a:p>
           <a:p>
             <a:pPr lvl="4"/>
             <a:r>
-              <a:rPr lang="de-DE" smtClean="0"/>
+              <a:rPr lang="de-DE" dirty="0" smtClean="0"/>
               <a:t>Fünfte Ebene</a:t>
             </a:r>
             <a:endParaRPr lang="en-US" dirty="0"/>
@@ -6100,7 +6105,7 @@
           <a:bodyPr vert="horz" lIns="91440" tIns="45720" rIns="91440" bIns="45720" rtlCol="0" anchor="ctr"/>
           <a:lstStyle>
             <a:lvl1pPr algn="r">
-              <a:defRPr sz="1000" b="0" i="0">
+              <a:defRPr sz="1200" b="0" i="0">
                 <a:solidFill>
                   <a:schemeClr val="tx1"/>
                 </a:solidFill>
@@ -6111,10 +6116,10 @@
           </a:lstStyle>
           <a:p>
             <a:r>
-              <a:rPr lang="de-DE" smtClean="0"/>
+              <a:rPr lang="de-DE" dirty="0" smtClean="0"/>
               <a:t>24.02.2016</a:t>
             </a:r>
-            <a:endParaRPr lang="de-DE"/>
+            <a:endParaRPr lang="de-DE" dirty="0"/>
           </a:p>
         </p:txBody>
       </p:sp>
@@ -6141,7 +6146,7 @@
           <a:bodyPr vert="horz" lIns="91440" tIns="45720" rIns="91440" bIns="45720" rtlCol="0" anchor="ctr"/>
           <a:lstStyle>
             <a:lvl1pPr algn="l">
-              <a:defRPr sz="1000" b="0" i="0">
+              <a:defRPr sz="1200" b="0" i="0">
                 <a:solidFill>
                   <a:schemeClr val="tx1"/>
                 </a:solidFill>
@@ -6152,10 +6157,10 @@
           </a:lstStyle>
           <a:p>
             <a:r>
-              <a:rPr lang="de-DE" smtClean="0"/>
+              <a:rPr lang="de-DE" dirty="0" smtClean="0"/>
               <a:t>Team Mammut</a:t>
             </a:r>
-            <a:endParaRPr lang="de-DE"/>
+            <a:endParaRPr lang="de-DE" dirty="0"/>
           </a:p>
         </p:txBody>
       </p:sp>
@@ -6182,7 +6187,7 @@
           <a:bodyPr vert="horz" lIns="91440" tIns="45720" rIns="91440" bIns="45720" rtlCol="0" anchor="ctr"/>
           <a:lstStyle>
             <a:lvl1pPr algn="r">
-              <a:defRPr sz="1000" b="0" i="0">
+              <a:defRPr sz="1200" b="0" i="0">
                 <a:solidFill>
                   <a:schemeClr val="tx1"/>
                 </a:solidFill>
@@ -6194,9 +6199,10 @@
           <a:p>
             <a:fld id="{C983B6F4-13B3-4691-B48D-7C8FEBC0F27E}" type="slidenum">
               <a:rPr lang="de-DE" smtClean="0"/>
+              <a:pPr/>
               <a:t>‹Nr.›</a:t>
             </a:fld>
-            <a:endParaRPr lang="de-DE"/>
+            <a:endParaRPr lang="de-DE" dirty="0"/>
           </a:p>
         </p:txBody>
       </p:sp>
@@ -6235,7 +6241,7 @@
           <a:spcPct val="0"/>
         </a:spcBef>
         <a:buNone/>
-        <a:defRPr sz="4000" kern="1200" cap="none">
+        <a:defRPr sz="4200" kern="1200" cap="none">
           <a:ln w="3175" cmpd="sng">
             <a:noFill/>
           </a:ln>
@@ -6321,7 +6327,7 @@
         <a:buSzPct val="145000"/>
         <a:buFont typeface="Arial"/>
         <a:buChar char="•"/>
-        <a:defRPr sz="2400" kern="1200" cap="none">
+        <a:defRPr sz="2600" kern="1200" cap="none">
           <a:solidFill>
             <a:schemeClr val="tx1"/>
           </a:solidFill>
@@ -6346,7 +6352,7 @@
         <a:buSzPct val="145000"/>
         <a:buFont typeface="Arial"/>
         <a:buChar char="•"/>
-        <a:defRPr sz="2000" kern="1200" cap="none">
+        <a:defRPr sz="2200" kern="1200" cap="none">
           <a:solidFill>
             <a:schemeClr val="tx1"/>
           </a:solidFill>
@@ -6371,7 +6377,7 @@
         <a:buSzPct val="145000"/>
         <a:buFont typeface="Arial"/>
         <a:buChar char="•"/>
-        <a:defRPr sz="1800" kern="1200" cap="none">
+        <a:defRPr sz="2000" kern="1200" cap="none">
           <a:solidFill>
             <a:schemeClr val="tx1"/>
           </a:solidFill>
@@ -7060,13 +7066,16 @@
         </p:nvSpPr>
         <p:spPr/>
         <p:txBody>
-          <a:bodyPr/>
+          <a:bodyPr>
+            <a:normAutofit/>
+          </a:bodyPr>
           <a:lstStyle/>
           <a:p>
             <a:r>
               <a:rPr lang="de-DE" dirty="0" smtClean="0"/>
-              <a:t>Umstellung von Schule auf Studium schwer</a:t>
-            </a:r>
+              <a:t>Einstieg ins Studium gestaltet sich schwer</a:t>
+            </a:r>
+            <a:endParaRPr lang="de-DE" dirty="0" smtClean="0"/>
           </a:p>
           <a:p>
             <a:r>
@@ -7083,8 +7092,17 @@
           <a:p>
             <a:r>
               <a:rPr lang="de-DE" dirty="0" smtClean="0"/>
-              <a:t>Unklare Vorgehensweise</a:t>
-            </a:r>
+              <a:t>Unklare </a:t>
+            </a:r>
+            <a:r>
+              <a:rPr lang="de-DE" dirty="0" smtClean="0"/>
+              <a:t>Vorgehensweise während der </a:t>
+            </a:r>
+            <a:r>
+              <a:rPr lang="de-DE" smtClean="0"/>
+              <a:t>ersten Semester</a:t>
+            </a:r>
+            <a:endParaRPr lang="de-DE" dirty="0" smtClean="0"/>
           </a:p>
           <a:p>
             <a:r>
@@ -7823,7 +7841,6 @@
               <a:rPr lang="de-DE" dirty="0"/>
               <a:t> Simon Oswald, Philipp Pütz</a:t>
             </a:r>
-            <a:endParaRPr lang="de-DE" dirty="0"/>
           </a:p>
         </p:txBody>
       </p:sp>

</xml_diff>